<commit_message>
(mani): Add repo qr code
</commit_message>
<xml_diff>
--- a/PasskeysPPT.pptx
+++ b/PasskeysPPT.pptx
@@ -343,6 +343,13 @@
             <a:tailEnd type="none" w="sm" len="sm"/>
           </a:ln>
         </p:spPr>
+        <p:txBody>
+          <a:bodyPr/>
+          <a:lstStyle/>
+          <a:p>
+            <a:endParaRPr lang="es-ES"/>
+          </a:p>
+        </p:txBody>
       </p:sp>
       <p:sp>
         <p:nvSpPr>
@@ -779,6 +786,13 @@
             <a:tailEnd type="none" w="sm" len="sm"/>
           </a:ln>
         </p:spPr>
+        <p:txBody>
+          <a:bodyPr/>
+          <a:lstStyle/>
+          <a:p>
+            <a:endParaRPr lang="es-ES"/>
+          </a:p>
+        </p:txBody>
       </p:sp>
       <p:sp>
         <p:nvSpPr>
@@ -933,6 +947,13 @@
             </a:pathLst>
           </a:custGeom>
         </p:spPr>
+        <p:txBody>
+          <a:bodyPr/>
+          <a:lstStyle/>
+          <a:p>
+            <a:endParaRPr lang="es-ES"/>
+          </a:p>
+        </p:txBody>
       </p:sp>
     </p:spTree>
   </p:cSld>
@@ -1037,6 +1058,13 @@
             </a:pathLst>
           </a:custGeom>
         </p:spPr>
+        <p:txBody>
+          <a:bodyPr/>
+          <a:lstStyle/>
+          <a:p>
+            <a:endParaRPr lang="es-ES"/>
+          </a:p>
+        </p:txBody>
       </p:sp>
     </p:spTree>
   </p:cSld>
@@ -1141,6 +1169,13 @@
             </a:pathLst>
           </a:custGeom>
         </p:spPr>
+        <p:txBody>
+          <a:bodyPr/>
+          <a:lstStyle/>
+          <a:p>
+            <a:endParaRPr lang="es-ES"/>
+          </a:p>
+        </p:txBody>
       </p:sp>
     </p:spTree>
   </p:cSld>
@@ -1263,6 +1298,13 @@
             </a:pathLst>
           </a:custGeom>
         </p:spPr>
+        <p:txBody>
+          <a:bodyPr/>
+          <a:lstStyle/>
+          <a:p>
+            <a:endParaRPr lang="es-ES"/>
+          </a:p>
+        </p:txBody>
       </p:sp>
     </p:spTree>
     <p:extLst>
@@ -1372,6 +1414,13 @@
             </a:pathLst>
           </a:custGeom>
         </p:spPr>
+        <p:txBody>
+          <a:bodyPr/>
+          <a:lstStyle/>
+          <a:p>
+            <a:endParaRPr lang="es-ES"/>
+          </a:p>
+        </p:txBody>
       </p:sp>
     </p:spTree>
   </p:cSld>
@@ -1476,6 +1525,13 @@
             </a:pathLst>
           </a:custGeom>
         </p:spPr>
+        <p:txBody>
+          <a:bodyPr/>
+          <a:lstStyle/>
+          <a:p>
+            <a:endParaRPr lang="es-ES"/>
+          </a:p>
+        </p:txBody>
       </p:sp>
     </p:spTree>
   </p:cSld>
@@ -1552,6 +1608,13 @@
             <a:tailEnd type="none" w="sm" len="sm"/>
           </a:ln>
         </p:spPr>
+        <p:txBody>
+          <a:bodyPr/>
+          <a:lstStyle/>
+          <a:p>
+            <a:endParaRPr lang="es-ES"/>
+          </a:p>
+        </p:txBody>
       </p:sp>
       <p:sp>
         <p:nvSpPr>
@@ -3348,11 +3411,7 @@
             </a:pPr>
             <a:r>
               <a:rPr lang="en-US" dirty="0"/>
-              <a:t>Going </a:t>
-            </a:r>
-            <a:r>
-              <a:rPr lang="en-US" dirty="0" err="1"/>
-              <a:t>Passwordless</a:t>
+              <a:t>Going Passwordless</a:t>
             </a:r>
             <a:endParaRPr dirty="0"/>
           </a:p>
@@ -3409,23 +3468,7 @@
                   <a:schemeClr val="accent5"/>
                 </a:solidFill>
               </a:rPr>
-              <a:t>Passkeys </a:t>
-            </a:r>
-            <a:r>
-              <a:rPr lang="en-US" sz="12000" dirty="0" err="1">
-                <a:solidFill>
-                  <a:schemeClr val="accent5"/>
-                </a:solidFill>
-              </a:rPr>
-              <a:t>en</a:t>
-            </a:r>
-            <a:r>
-              <a:rPr lang="en-US" sz="12000" dirty="0">
-                <a:solidFill>
-                  <a:schemeClr val="accent5"/>
-                </a:solidFill>
-              </a:rPr>
-              <a:t> ASP.NET Core</a:t>
+              <a:t>Passkeys en ASP.NET Core</a:t>
             </a:r>
             <a:endParaRPr sz="12000" dirty="0"/>
           </a:p>
@@ -4108,7 +4151,7 @@
               <a:buNone/>
             </a:pPr>
             <a:r>
-              <a:rPr lang="en-US" sz="3600" b="0" u="none" dirty="0" err="1">
+              <a:rPr lang="en-US" sz="3600" b="0" u="none" dirty="0">
                 <a:solidFill>
                   <a:srgbClr val="BBA7F1"/>
                 </a:solidFill>
@@ -4117,79 +4160,7 @@
                 <a:cs typeface="Poppins"/>
                 <a:sym typeface="Poppins"/>
               </a:rPr>
-              <a:t>Necesitamos</a:t>
-            </a:r>
-            <a:r>
-              <a:rPr lang="en-US" sz="3600" b="0" u="none" dirty="0">
-                <a:solidFill>
-                  <a:srgbClr val="BBA7F1"/>
-                </a:solidFill>
-                <a:latin typeface="Poppins"/>
-                <a:ea typeface="Poppins"/>
-                <a:cs typeface="Poppins"/>
-                <a:sym typeface="Poppins"/>
-              </a:rPr>
-              <a:t> </a:t>
-            </a:r>
-            <a:r>
-              <a:rPr lang="en-US" sz="3600" b="0" u="none" dirty="0" err="1">
-                <a:solidFill>
-                  <a:srgbClr val="BBA7F1"/>
-                </a:solidFill>
-                <a:latin typeface="Poppins"/>
-                <a:ea typeface="Poppins"/>
-                <a:cs typeface="Poppins"/>
-                <a:sym typeface="Poppins"/>
-              </a:rPr>
-              <a:t>una</a:t>
-            </a:r>
-            <a:r>
-              <a:rPr lang="en-US" sz="3600" b="0" u="none" dirty="0">
-                <a:solidFill>
-                  <a:srgbClr val="BBA7F1"/>
-                </a:solidFill>
-                <a:latin typeface="Poppins"/>
-                <a:ea typeface="Poppins"/>
-                <a:cs typeface="Poppins"/>
-                <a:sym typeface="Poppins"/>
-              </a:rPr>
-              <a:t> </a:t>
-            </a:r>
-            <a:r>
-              <a:rPr lang="en-US" sz="3600" b="0" u="none" dirty="0" err="1">
-                <a:solidFill>
-                  <a:srgbClr val="BBA7F1"/>
-                </a:solidFill>
-                <a:latin typeface="Poppins"/>
-                <a:ea typeface="Poppins"/>
-                <a:cs typeface="Poppins"/>
-                <a:sym typeface="Poppins"/>
-              </a:rPr>
-              <a:t>alternativa</a:t>
-            </a:r>
-            <a:r>
-              <a:rPr lang="en-US" sz="3600" b="0" u="none" dirty="0">
-                <a:solidFill>
-                  <a:srgbClr val="BBA7F1"/>
-                </a:solidFill>
-                <a:latin typeface="Poppins"/>
-                <a:ea typeface="Poppins"/>
-                <a:cs typeface="Poppins"/>
-                <a:sym typeface="Poppins"/>
-              </a:rPr>
-              <a:t> </a:t>
-            </a:r>
-            <a:r>
-              <a:rPr lang="en-US" sz="3600" b="0" u="none" dirty="0" err="1">
-                <a:solidFill>
-                  <a:srgbClr val="BBA7F1"/>
-                </a:solidFill>
-                <a:latin typeface="Poppins"/>
-                <a:ea typeface="Poppins"/>
-                <a:cs typeface="Poppins"/>
-                <a:sym typeface="Poppins"/>
-              </a:rPr>
-              <a:t>mejor</a:t>
+              <a:t>Necesitamos una alternativa mejor</a:t>
             </a:r>
             <a:endParaRPr sz="3600" b="0" u="none" dirty="0">
               <a:solidFill>
@@ -4350,7 +4321,7 @@
               <a:buChar char="•"/>
             </a:pPr>
             <a:r>
-              <a:rPr lang="en-US" sz="4000" b="0" i="0" u="none" strike="noStrike" cap="none">
+              <a:rPr lang="en-US" sz="4000" b="0" i="0" u="none" strike="noStrike" cap="none" dirty="0">
                 <a:solidFill>
                   <a:srgbClr val="BBA7F1"/>
                 </a:solidFill>
@@ -4362,7 +4333,7 @@
               <a:t> </a:t>
             </a:r>
             <a:r>
-              <a:rPr lang="en-US" sz="4000" b="0" i="0" u="none" strike="noStrike" cap="none">
+              <a:rPr lang="en-US" sz="4000" b="0" i="0" u="none" strike="noStrike" cap="none" dirty="0" err="1">
                 <a:solidFill>
                   <a:srgbClr val="BBA7F1"/>
                 </a:solidFill>
@@ -4371,9 +4342,81 @@
                 <a:cs typeface="Poppins"/>
                 <a:sym typeface="Poppins"/>
               </a:rPr>
-              <a:t>Credenciales basadas en criptografía de clave pública</a:t>
-            </a:r>
-            <a:endParaRPr/>
+              <a:t>Credenciales</a:t>
+            </a:r>
+            <a:r>
+              <a:rPr lang="en-US" sz="4000" b="0" i="0" u="none" strike="noStrike" cap="none" dirty="0">
+                <a:solidFill>
+                  <a:srgbClr val="BBA7F1"/>
+                </a:solidFill>
+                <a:latin typeface="Poppins"/>
+                <a:ea typeface="Poppins"/>
+                <a:cs typeface="Poppins"/>
+                <a:sym typeface="Poppins"/>
+              </a:rPr>
+              <a:t> </a:t>
+            </a:r>
+            <a:r>
+              <a:rPr lang="en-US" sz="4000" b="0" i="0" u="none" strike="noStrike" cap="none" dirty="0" err="1">
+                <a:solidFill>
+                  <a:srgbClr val="BBA7F1"/>
+                </a:solidFill>
+                <a:latin typeface="Poppins"/>
+                <a:ea typeface="Poppins"/>
+                <a:cs typeface="Poppins"/>
+                <a:sym typeface="Poppins"/>
+              </a:rPr>
+              <a:t>basadas</a:t>
+            </a:r>
+            <a:r>
+              <a:rPr lang="en-US" sz="4000" b="0" i="0" u="none" strike="noStrike" cap="none" dirty="0">
+                <a:solidFill>
+                  <a:srgbClr val="BBA7F1"/>
+                </a:solidFill>
+                <a:latin typeface="Poppins"/>
+                <a:ea typeface="Poppins"/>
+                <a:cs typeface="Poppins"/>
+                <a:sym typeface="Poppins"/>
+              </a:rPr>
+              <a:t> en </a:t>
+            </a:r>
+            <a:r>
+              <a:rPr lang="en-US" sz="4000" b="0" i="0" u="none" strike="noStrike" cap="none" dirty="0" err="1">
+                <a:solidFill>
+                  <a:srgbClr val="BBA7F1"/>
+                </a:solidFill>
+                <a:latin typeface="Poppins"/>
+                <a:ea typeface="Poppins"/>
+                <a:cs typeface="Poppins"/>
+                <a:sym typeface="Poppins"/>
+              </a:rPr>
+              <a:t>criptografía</a:t>
+            </a:r>
+            <a:r>
+              <a:rPr lang="en-US" sz="4000" b="0" i="0" u="none" strike="noStrike" cap="none" dirty="0">
+                <a:solidFill>
+                  <a:srgbClr val="BBA7F1"/>
+                </a:solidFill>
+                <a:latin typeface="Poppins"/>
+                <a:ea typeface="Poppins"/>
+                <a:cs typeface="Poppins"/>
+                <a:sym typeface="Poppins"/>
+              </a:rPr>
+              <a:t> de clave </a:t>
+            </a:r>
+            <a:r>
+              <a:rPr lang="en-US" sz="4000" b="0" i="0" u="none" strike="noStrike" cap="none" dirty="0" err="1">
+                <a:solidFill>
+                  <a:srgbClr val="BBA7F1"/>
+                </a:solidFill>
+                <a:latin typeface="Poppins"/>
+                <a:ea typeface="Poppins"/>
+                <a:cs typeface="Poppins"/>
+                <a:sym typeface="Poppins"/>
+              </a:rPr>
+              <a:t>pública</a:t>
+            </a:r>
+            <a:endParaRPr dirty="0"/>
           </a:p>
           <a:p>
             <a:pPr marL="0" marR="0" lvl="0" indent="0" algn="l" rtl="0">
@@ -4393,7 +4436,7 @@
               <a:buFont typeface="Calibri"/>
               <a:buNone/>
             </a:pPr>
-            <a:endParaRPr sz="4000" b="0" i="0" u="none" strike="noStrike" cap="none">
+            <a:endParaRPr sz="4000" b="0" i="0" u="none" strike="noStrike" cap="none" dirty="0">
               <a:solidFill>
                 <a:srgbClr val="BBA7F1"/>
               </a:solidFill>
@@ -4422,7 +4465,7 @@
               <a:buChar char="•"/>
             </a:pPr>
             <a:r>
-              <a:rPr lang="en-US" sz="4000">
+              <a:rPr lang="en-US" sz="4000" dirty="0">
                 <a:solidFill>
                   <a:srgbClr val="BBA7F1"/>
                 </a:solidFill>
@@ -4434,7 +4477,7 @@
               <a:t> </a:t>
             </a:r>
             <a:r>
-              <a:rPr lang="en-US" sz="4000" b="0" i="0" u="none" strike="noStrike" cap="none">
+              <a:rPr lang="en-US" sz="4000" b="0" i="0" u="none" strike="noStrike" cap="none" dirty="0" err="1">
                 <a:solidFill>
                   <a:srgbClr val="BBA7F1"/>
                 </a:solidFill>
@@ -4443,9 +4486,57 @@
                 <a:cs typeface="Poppins"/>
                 <a:sym typeface="Poppins"/>
               </a:rPr>
-              <a:t>Funcionan con biometría o PIN del dispositivo</a:t>
-            </a:r>
-            <a:endParaRPr/>
+              <a:t>Funcionan</a:t>
+            </a:r>
+            <a:r>
+              <a:rPr lang="en-US" sz="4000" b="0" i="0" u="none" strike="noStrike" cap="none" dirty="0">
+                <a:solidFill>
+                  <a:srgbClr val="BBA7F1"/>
+                </a:solidFill>
+                <a:latin typeface="Poppins"/>
+                <a:ea typeface="Poppins"/>
+                <a:cs typeface="Poppins"/>
+                <a:sym typeface="Poppins"/>
+              </a:rPr>
+              <a:t> con </a:t>
+            </a:r>
+            <a:r>
+              <a:rPr lang="en-US" sz="4000" b="0" i="0" u="none" strike="noStrike" cap="none" dirty="0" err="1">
+                <a:solidFill>
+                  <a:srgbClr val="BBA7F1"/>
+                </a:solidFill>
+                <a:latin typeface="Poppins"/>
+                <a:ea typeface="Poppins"/>
+                <a:cs typeface="Poppins"/>
+                <a:sym typeface="Poppins"/>
+              </a:rPr>
+              <a:t>biometría</a:t>
+            </a:r>
+            <a:r>
+              <a:rPr lang="en-US" sz="4000" b="0" i="0" u="none" strike="noStrike" cap="none" dirty="0">
+                <a:solidFill>
+                  <a:srgbClr val="BBA7F1"/>
+                </a:solidFill>
+                <a:latin typeface="Poppins"/>
+                <a:ea typeface="Poppins"/>
+                <a:cs typeface="Poppins"/>
+                <a:sym typeface="Poppins"/>
+              </a:rPr>
+              <a:t> o PIN del </a:t>
+            </a:r>
+            <a:r>
+              <a:rPr lang="en-US" sz="4000" b="0" i="0" u="none" strike="noStrike" cap="none" dirty="0" err="1">
+                <a:solidFill>
+                  <a:srgbClr val="BBA7F1"/>
+                </a:solidFill>
+                <a:latin typeface="Poppins"/>
+                <a:ea typeface="Poppins"/>
+                <a:cs typeface="Poppins"/>
+                <a:sym typeface="Poppins"/>
+              </a:rPr>
+              <a:t>dispositivo</a:t>
+            </a:r>
+            <a:endParaRPr dirty="0"/>
           </a:p>
           <a:p>
             <a:pPr marL="0" marR="0" lvl="0" indent="0" algn="l" rtl="0">
@@ -4465,7 +4556,7 @@
               <a:buFont typeface="Calibri"/>
               <a:buNone/>
             </a:pPr>
-            <a:endParaRPr sz="4000" b="0" i="0" u="none" strike="noStrike" cap="none">
+            <a:endParaRPr sz="4000" b="0" i="0" u="none" strike="noStrike" cap="none" dirty="0">
               <a:solidFill>
                 <a:srgbClr val="BBA7F1"/>
               </a:solidFill>
@@ -4494,7 +4585,7 @@
               <a:buChar char="•"/>
             </a:pPr>
             <a:r>
-              <a:rPr lang="en-US" sz="4000" b="0" i="0" u="none" strike="noStrike" cap="none">
+              <a:rPr lang="en-US" sz="4000" b="0" i="0" u="none" strike="noStrike" cap="none" dirty="0">
                 <a:solidFill>
                   <a:srgbClr val="BBA7F1"/>
                 </a:solidFill>
@@ -4503,9 +4594,33 @@
                 <a:cs typeface="Poppins"/>
                 <a:sym typeface="Poppins"/>
               </a:rPr>
-              <a:t> Resistentes al phishing</a:t>
-            </a:r>
-            <a:endParaRPr/>
+              <a:t> </a:t>
+            </a:r>
+            <a:r>
+              <a:rPr lang="en-US" sz="4000" b="0" i="0" u="none" strike="noStrike" cap="none" dirty="0" err="1">
+                <a:solidFill>
+                  <a:srgbClr val="BBA7F1"/>
+                </a:solidFill>
+                <a:latin typeface="Poppins"/>
+                <a:ea typeface="Poppins"/>
+                <a:cs typeface="Poppins"/>
+                <a:sym typeface="Poppins"/>
+              </a:rPr>
+              <a:t>Resistentes</a:t>
+            </a:r>
+            <a:r>
+              <a:rPr lang="en-US" sz="4000" b="0" i="0" u="none" strike="noStrike" cap="none" dirty="0">
+                <a:solidFill>
+                  <a:srgbClr val="BBA7F1"/>
+                </a:solidFill>
+                <a:latin typeface="Poppins"/>
+                <a:ea typeface="Poppins"/>
+                <a:cs typeface="Poppins"/>
+                <a:sym typeface="Poppins"/>
+              </a:rPr>
+              <a:t> al phishing</a:t>
+            </a:r>
+            <a:endParaRPr dirty="0"/>
           </a:p>
           <a:p>
             <a:pPr marL="0" marR="0" lvl="0" indent="0" algn="l" rtl="0">
@@ -4520,7 +4635,7 @@
               </a:spcAft>
               <a:buNone/>
             </a:pPr>
-            <a:endParaRPr sz="4000" b="0" i="0" u="none" strike="noStrike" cap="none">
+            <a:endParaRPr sz="4000" b="0" i="0" u="none" strike="noStrike" cap="none" dirty="0">
               <a:solidFill>
                 <a:srgbClr val="BBA7F1"/>
               </a:solidFill>
@@ -5195,31 +5310,7 @@
                 <a:cs typeface="Poppins"/>
                 <a:sym typeface="Poppins"/>
               </a:rPr>
-              <a:t>Passkeys </a:t>
-            </a:r>
-            <a:r>
-              <a:rPr lang="en-US" sz="10000" dirty="0" err="1">
-                <a:solidFill>
-                  <a:schemeClr val="lt1"/>
-                </a:solidFill>
-                <a:latin typeface="Poppins"/>
-                <a:ea typeface="Poppins"/>
-                <a:cs typeface="Poppins"/>
-                <a:sym typeface="Poppins"/>
-              </a:rPr>
-              <a:t>en</a:t>
-            </a:r>
-            <a:r>
-              <a:rPr lang="en-US" sz="10000" dirty="0">
-                <a:solidFill>
-                  <a:schemeClr val="lt1"/>
-                </a:solidFill>
-                <a:latin typeface="Poppins"/>
-                <a:ea typeface="Poppins"/>
-                <a:cs typeface="Poppins"/>
-                <a:sym typeface="Poppins"/>
-              </a:rPr>
-              <a:t> .NET</a:t>
+              <a:t>Passkeys en .NET</a:t>
             </a:r>
             <a:endParaRPr dirty="0"/>
           </a:p>
@@ -6535,7 +6626,7 @@
         </p:nvSpPr>
         <p:spPr>
           <a:xfrm>
-            <a:off x="1039108" y="6078642"/>
+            <a:off x="1148836" y="1872402"/>
             <a:ext cx="7010400" cy="1289311"/>
           </a:xfrm>
           <a:prstGeom prst="rect">
@@ -6569,7 +6660,7 @@
               <a:buNone/>
             </a:pPr>
             <a:r>
-              <a:rPr lang="en-US" b="1" dirty="0" err="1">
+              <a:rPr lang="en-US" b="1" dirty="0">
                 <a:solidFill>
                   <a:schemeClr val="lt1"/>
                 </a:solidFill>
@@ -6580,6 +6671,108 @@
               <a:solidFill>
                 <a:schemeClr val="lt1"/>
               </a:solidFill>
+            </a:endParaRPr>
+          </a:p>
+        </p:txBody>
+      </p:sp>
+      <p:pic>
+        <p:nvPicPr>
+          <p:cNvPr id="3" name="Imagen 2" descr="Código QR&#10;&#10;El contenido generado por IA puede ser incorrecto.">
+            <a:extLst>
+              <a:ext uri="{FF2B5EF4-FFF2-40B4-BE49-F238E27FC236}">
+                <a16:creationId xmlns:a16="http://schemas.microsoft.com/office/drawing/2014/main" id="{349F0E00-B82C-2245-25FB-35173DB2CDD8}"/>
+              </a:ext>
+            </a:extLst>
+          </p:cNvPr>
+          <p:cNvPicPr>
+            <a:picLocks noChangeAspect="1"/>
+          </p:cNvPicPr>
+          <p:nvPr/>
+        </p:nvPicPr>
+        <p:blipFill>
+          <a:blip r:embed="rId3"/>
+          <a:stretch>
+            <a:fillRect/>
+          </a:stretch>
+        </p:blipFill>
+        <p:spPr>
+          <a:xfrm>
+            <a:off x="1350949" y="5388953"/>
+            <a:ext cx="4924623" cy="4990727"/>
+          </a:xfrm>
+          <a:prstGeom prst="rect">
+            <a:avLst/>
+          </a:prstGeom>
+        </p:spPr>
+      </p:pic>
+      <p:sp>
+        <p:nvSpPr>
+          <p:cNvPr id="4" name="Google Shape;545;p2">
+            <a:extLst>
+              <a:ext uri="{FF2B5EF4-FFF2-40B4-BE49-F238E27FC236}">
+                <a16:creationId xmlns:a16="http://schemas.microsoft.com/office/drawing/2014/main" id="{A07976EF-EC82-306B-D27F-95AE8FAFF480}"/>
+              </a:ext>
+            </a:extLst>
+          </p:cNvPr>
+          <p:cNvSpPr txBox="1"/>
+          <p:nvPr/>
+        </p:nvSpPr>
+        <p:spPr>
+          <a:xfrm>
+            <a:off x="1350949" y="4554178"/>
+            <a:ext cx="4924623" cy="834775"/>
+          </a:xfrm>
+          <a:prstGeom prst="rect">
+            <a:avLst/>
+          </a:prstGeom>
+          <a:noFill/>
+          <a:ln>
+            <a:noFill/>
+          </a:ln>
+        </p:spPr>
+        <p:txBody>
+          <a:bodyPr spcFirstLastPara="1" wrap="square" lIns="91425" tIns="45700" rIns="91425" bIns="45700" anchor="t" anchorCtr="0">
+            <a:noAutofit/>
+          </a:bodyPr>
+          <a:lstStyle/>
+          <a:p>
+            <a:pPr marL="0" marR="0" lvl="0" indent="0" algn="ctr" rtl="0">
+              <a:lnSpc>
+                <a:spcPct val="77777"/>
+              </a:lnSpc>
+              <a:spcBef>
+                <a:spcPts val="0"/>
+              </a:spcBef>
+              <a:spcAft>
+                <a:spcPts val="0"/>
+              </a:spcAft>
+              <a:buClr>
+                <a:srgbClr val="BBA7F1"/>
+              </a:buClr>
+              <a:buSzPts val="3600"/>
+              <a:buFont typeface="Arial"/>
+              <a:buNone/>
+            </a:pPr>
+            <a:r>
+              <a:rPr lang="en-US" sz="3600" b="0" u="none" dirty="0">
+                <a:solidFill>
+                  <a:srgbClr val="BBA7F1"/>
+                </a:solidFill>
+                <a:latin typeface="Poppins"/>
+                <a:ea typeface="Poppins"/>
+                <a:cs typeface="Poppins"/>
+                <a:sym typeface="Poppins"/>
+              </a:rPr>
+              <a:t>Repositorio GitHub</a:t>
+            </a:r>
+            <a:endParaRPr sz="3600" b="0" u="none" dirty="0">
+              <a:solidFill>
+                <a:srgbClr val="BBA7F1"/>
+              </a:solidFill>
+              <a:latin typeface="Poppins"/>
+              <a:ea typeface="Poppins"/>
+              <a:cs typeface="Poppins"/>
+              <a:sym typeface="Poppins"/>
             </a:endParaRPr>
           </a:p>
         </p:txBody>

</xml_diff>